<commit_message>
Primera y segunda semana
</commit_message>
<xml_diff>
--- a/Semana 1.pptx
+++ b/Semana 1.pptx
@@ -11,7 +11,10 @@
     <p:sldId id="261" r:id="rId5"/>
     <p:sldId id="278" r:id="rId6"/>
     <p:sldId id="279" r:id="rId7"/>
-    <p:sldId id="280" r:id="rId8"/>
+    <p:sldId id="283" r:id="rId8"/>
+    <p:sldId id="282" r:id="rId9"/>
+    <p:sldId id="281" r:id="rId10"/>
+    <p:sldId id="280" r:id="rId11"/>
   </p:sldIdLst>
   <p:sldSz cx="9144000" cy="6858000" type="screen4x3"/>
   <p:notesSz cx="6858000" cy="9144000"/>
@@ -301,7 +304,7 @@
           <a:p>
             <a:fld id="{2BD09FA6-5415-4E41-8EC0-843F16C90881}" type="datetimeFigureOut">
               <a:rPr lang="en-US" smtClean="0"/>
-              <a:t>1/9/2017</a:t>
+              <a:t>1/12/2017</a:t>
             </a:fld>
             <a:endParaRPr lang="en-US"/>
           </a:p>
@@ -501,7 +504,7 @@
           <a:p>
             <a:fld id="{2BD09FA6-5415-4E41-8EC0-843F16C90881}" type="datetimeFigureOut">
               <a:rPr lang="en-US" smtClean="0"/>
-              <a:t>1/9/2017</a:t>
+              <a:t>1/12/2017</a:t>
             </a:fld>
             <a:endParaRPr lang="en-US"/>
           </a:p>
@@ -676,7 +679,7 @@
           <a:p>
             <a:fld id="{2BD09FA6-5415-4E41-8EC0-843F16C90881}" type="datetimeFigureOut">
               <a:rPr lang="en-US" smtClean="0"/>
-              <a:t>1/9/2017</a:t>
+              <a:t>1/12/2017</a:t>
             </a:fld>
             <a:endParaRPr lang="en-US"/>
           </a:p>
@@ -841,7 +844,7 @@
           <a:p>
             <a:fld id="{2BD09FA6-5415-4E41-8EC0-843F16C90881}" type="datetimeFigureOut">
               <a:rPr lang="en-US" smtClean="0"/>
-              <a:t>1/9/2017</a:t>
+              <a:t>1/12/2017</a:t>
             </a:fld>
             <a:endParaRPr lang="en-US"/>
           </a:p>
@@ -1089,7 +1092,7 @@
           <a:p>
             <a:fld id="{2BD09FA6-5415-4E41-8EC0-843F16C90881}" type="datetimeFigureOut">
               <a:rPr lang="en-US" smtClean="0"/>
-              <a:t>1/9/2017</a:t>
+              <a:t>1/12/2017</a:t>
             </a:fld>
             <a:endParaRPr lang="en-US"/>
           </a:p>
@@ -1407,7 +1410,7 @@
           <a:p>
             <a:fld id="{2BD09FA6-5415-4E41-8EC0-843F16C90881}" type="datetimeFigureOut">
               <a:rPr lang="en-US" smtClean="0"/>
-              <a:t>1/9/2017</a:t>
+              <a:t>1/12/2017</a:t>
             </a:fld>
             <a:endParaRPr lang="en-US"/>
           </a:p>
@@ -1873,7 +1876,7 @@
           <a:p>
             <a:fld id="{2BD09FA6-5415-4E41-8EC0-843F16C90881}" type="datetimeFigureOut">
               <a:rPr lang="en-US" smtClean="0"/>
-              <a:t>1/9/2017</a:t>
+              <a:t>1/12/2017</a:t>
             </a:fld>
             <a:endParaRPr lang="en-US"/>
           </a:p>
@@ -2021,7 +2024,7 @@
           <a:p>
             <a:fld id="{2BD09FA6-5415-4E41-8EC0-843F16C90881}" type="datetimeFigureOut">
               <a:rPr lang="en-US" smtClean="0"/>
-              <a:t>1/9/2017</a:t>
+              <a:t>1/12/2017</a:t>
             </a:fld>
             <a:endParaRPr lang="en-US"/>
           </a:p>
@@ -2111,7 +2114,7 @@
           <a:p>
             <a:fld id="{2BD09FA6-5415-4E41-8EC0-843F16C90881}" type="datetimeFigureOut">
               <a:rPr lang="en-US" smtClean="0"/>
-              <a:t>1/9/2017</a:t>
+              <a:t>1/12/2017</a:t>
             </a:fld>
             <a:endParaRPr lang="en-US"/>
           </a:p>
@@ -2385,7 +2388,7 @@
           <a:p>
             <a:fld id="{2BD09FA6-5415-4E41-8EC0-843F16C90881}" type="datetimeFigureOut">
               <a:rPr lang="en-US" smtClean="0"/>
-              <a:t>1/9/2017</a:t>
+              <a:t>1/12/2017</a:t>
             </a:fld>
             <a:endParaRPr lang="en-US"/>
           </a:p>
@@ -2690,7 +2693,7 @@
           <a:p>
             <a:fld id="{2BD09FA6-5415-4E41-8EC0-843F16C90881}" type="datetimeFigureOut">
               <a:rPr lang="en-US" smtClean="0"/>
-              <a:t>1/9/2017</a:t>
+              <a:t>1/12/2017</a:t>
             </a:fld>
             <a:endParaRPr lang="en-US"/>
           </a:p>
@@ -2988,7 +2991,7 @@
           <a:p>
             <a:fld id="{2BD09FA6-5415-4E41-8EC0-843F16C90881}" type="datetimeFigureOut">
               <a:rPr lang="en-US" smtClean="0"/>
-              <a:t>1/9/2017</a:t>
+              <a:t>1/12/2017</a:t>
             </a:fld>
             <a:endParaRPr lang="en-US"/>
           </a:p>
@@ -3507,6 +3510,103 @@
 </p:sld>
 </file>
 
+<file path=ppt/slides/slide10.xml><?xml version="1.0" encoding="utf-8"?>
+<p:sld xmlns:a="http://schemas.openxmlformats.org/drawingml/2006/main" xmlns:r="http://schemas.openxmlformats.org/officeDocument/2006/relationships" xmlns:p="http://schemas.openxmlformats.org/presentationml/2006/main">
+  <p:cSld>
+    <p:spTree>
+      <p:nvGrpSpPr>
+        <p:cNvPr id="1" name=""/>
+        <p:cNvGrpSpPr/>
+        <p:nvPr/>
+      </p:nvGrpSpPr>
+      <p:grpSpPr>
+        <a:xfrm>
+          <a:off x="0" y="0"/>
+          <a:ext cx="0" cy="0"/>
+          <a:chOff x="0" y="0"/>
+          <a:chExt cx="0" cy="0"/>
+        </a:xfrm>
+      </p:grpSpPr>
+      <p:sp>
+        <p:nvSpPr>
+          <p:cNvPr id="2" name="Title 1"/>
+          <p:cNvSpPr>
+            <a:spLocks noGrp="1"/>
+          </p:cNvSpPr>
+          <p:nvPr>
+            <p:ph type="title"/>
+          </p:nvPr>
+        </p:nvSpPr>
+        <p:spPr/>
+        <p:txBody>
+          <a:bodyPr/>
+          <a:lstStyle/>
+          <a:p>
+            <a:r>
+              <a:rPr lang="en-US" dirty="0" err="1" smtClean="0"/>
+              <a:t>Algoritmo</a:t>
+            </a:r>
+            <a:endParaRPr lang="en-US" dirty="0"/>
+          </a:p>
+        </p:txBody>
+      </p:sp>
+      <p:sp>
+        <p:nvSpPr>
+          <p:cNvPr id="3" name="Content Placeholder 2"/>
+          <p:cNvSpPr>
+            <a:spLocks noGrp="1"/>
+          </p:cNvSpPr>
+          <p:nvPr>
+            <p:ph idx="1"/>
+          </p:nvPr>
+        </p:nvSpPr>
+        <p:spPr/>
+        <p:txBody>
+          <a:bodyPr/>
+          <a:lstStyle/>
+          <a:p>
+            <a:r>
+              <a:rPr lang="es-ES" dirty="0" smtClean="0"/>
+              <a:t>Es </a:t>
+            </a:r>
+            <a:r>
+              <a:rPr lang="es-ES" dirty="0"/>
+              <a:t>un conjunto prescrito de instrucciones o reglas bien definidas, ordenadas y finitas que permite llevar a cabo una actividad mediante pasos sucesivos que no generen dudas a quien deba hacer dicha </a:t>
+            </a:r>
+            <a:r>
+              <a:rPr lang="es-ES" dirty="0" smtClean="0"/>
+              <a:t>actividad</a:t>
+            </a:r>
+          </a:p>
+          <a:p>
+            <a:r>
+              <a:rPr lang="es-ES" dirty="0" smtClean="0"/>
+              <a:t>Ejemplos</a:t>
+            </a:r>
+            <a:endParaRPr lang="en-US" dirty="0"/>
+          </a:p>
+        </p:txBody>
+      </p:sp>
+    </p:spTree>
+    <p:extLst>
+      <p:ext uri="{BB962C8B-B14F-4D97-AF65-F5344CB8AC3E}">
+        <p14:creationId xmlns:p14="http://schemas.microsoft.com/office/powerpoint/2010/main" val="2866603582"/>
+      </p:ext>
+    </p:extLst>
+  </p:cSld>
+  <p:clrMapOvr>
+    <a:masterClrMapping/>
+  </p:clrMapOvr>
+  <p:timing>
+    <p:tnLst>
+      <p:par>
+        <p:cTn id="1" dur="indefinite" restart="never" nodeType="tmRoot"/>
+      </p:par>
+    </p:tnLst>
+  </p:timing>
+</p:sld>
+</file>
+
 <file path=ppt/slides/slide2.xml><?xml version="1.0" encoding="utf-8"?>
 <p:sld xmlns:a="http://schemas.openxmlformats.org/drawingml/2006/main" xmlns:r="http://schemas.openxmlformats.org/officeDocument/2006/relationships" xmlns:p="http://schemas.openxmlformats.org/presentationml/2006/main">
   <p:cSld>
@@ -3590,27 +3690,26 @@
               <a:rPr lang="en-US" dirty="0" smtClean="0"/>
               <a:t>?</a:t>
             </a:r>
+          </a:p>
+          <a:p>
+            <a:r>
+              <a:rPr lang="en-US" dirty="0" err="1" smtClean="0"/>
+              <a:t>Lenguajes</a:t>
+            </a:r>
+            <a:r>
+              <a:rPr lang="en-US" dirty="0" smtClean="0"/>
+              <a:t> de </a:t>
+            </a:r>
+            <a:r>
+              <a:rPr lang="en-US" dirty="0" err="1" smtClean="0"/>
+              <a:t>programación</a:t>
+            </a:r>
             <a:endParaRPr lang="en-US" dirty="0" smtClean="0"/>
           </a:p>
           <a:p>
             <a:r>
               <a:rPr lang="en-US" dirty="0" err="1" smtClean="0"/>
               <a:t>Algoritmos</a:t>
-            </a:r>
-            <a:endParaRPr lang="en-US" dirty="0" smtClean="0"/>
-          </a:p>
-          <a:p>
-            <a:r>
-              <a:rPr lang="en-US" dirty="0" err="1" smtClean="0"/>
-              <a:t>Diagramas</a:t>
-            </a:r>
-            <a:r>
-              <a:rPr lang="en-US" dirty="0" smtClean="0"/>
-              <a:t> de </a:t>
-            </a:r>
-            <a:r>
-              <a:rPr lang="en-US" dirty="0" err="1" smtClean="0"/>
-              <a:t>flujo</a:t>
             </a:r>
             <a:endParaRPr lang="en-US" dirty="0" smtClean="0"/>
           </a:p>
@@ -4619,7 +4718,177 @@
   <p:timing>
     <p:tnLst>
       <p:par>
-        <p:cTn id="1" dur="indefinite" restart="never" nodeType="tmRoot"/>
+        <p:cTn id="1" dur="indefinite" restart="never" nodeType="tmRoot">
+          <p:childTnLst>
+            <p:seq concurrent="1" nextAc="seek">
+              <p:cTn id="2" dur="indefinite" nodeType="mainSeq">
+                <p:childTnLst>
+                  <p:par>
+                    <p:cTn id="3" fill="hold">
+                      <p:stCondLst>
+                        <p:cond delay="indefinite"/>
+                      </p:stCondLst>
+                      <p:childTnLst>
+                        <p:par>
+                          <p:cTn id="4" fill="hold">
+                            <p:stCondLst>
+                              <p:cond delay="0"/>
+                            </p:stCondLst>
+                            <p:childTnLst>
+                              <p:par>
+                                <p:cTn id="5" presetID="1" presetClass="entr" presetSubtype="0" fill="hold" nodeType="clickEffect">
+                                  <p:stCondLst>
+                                    <p:cond delay="0"/>
+                                  </p:stCondLst>
+                                  <p:childTnLst>
+                                    <p:set>
+                                      <p:cBhvr>
+                                        <p:cTn id="6" dur="1" fill="hold">
+                                          <p:stCondLst>
+                                            <p:cond delay="0"/>
+                                          </p:stCondLst>
+                                        </p:cTn>
+                                        <p:tgtEl>
+                                          <p:spTgt spid="3">
+                                            <p:txEl>
+                                              <p:pRg st="0" end="0"/>
+                                            </p:txEl>
+                                          </p:spTgt>
+                                        </p:tgtEl>
+                                        <p:attrNameLst>
+                                          <p:attrName>style.visibility</p:attrName>
+                                        </p:attrNameLst>
+                                      </p:cBhvr>
+                                      <p:to>
+                                        <p:strVal val="visible"/>
+                                      </p:to>
+                                    </p:set>
+                                  </p:childTnLst>
+                                </p:cTn>
+                              </p:par>
+                            </p:childTnLst>
+                          </p:cTn>
+                        </p:par>
+                      </p:childTnLst>
+                    </p:cTn>
+                  </p:par>
+                  <p:par>
+                    <p:cTn id="7" fill="hold">
+                      <p:stCondLst>
+                        <p:cond delay="indefinite"/>
+                      </p:stCondLst>
+                      <p:childTnLst>
+                        <p:par>
+                          <p:cTn id="8" fill="hold">
+                            <p:stCondLst>
+                              <p:cond delay="0"/>
+                            </p:stCondLst>
+                            <p:childTnLst>
+                              <p:par>
+                                <p:cTn id="9" presetID="1" presetClass="entr" presetSubtype="0" fill="hold" nodeType="clickEffect">
+                                  <p:stCondLst>
+                                    <p:cond delay="0"/>
+                                  </p:stCondLst>
+                                  <p:childTnLst>
+                                    <p:set>
+                                      <p:cBhvr>
+                                        <p:cTn id="10" dur="1" fill="hold">
+                                          <p:stCondLst>
+                                            <p:cond delay="0"/>
+                                          </p:stCondLst>
+                                        </p:cTn>
+                                        <p:tgtEl>
+                                          <p:spTgt spid="3">
+                                            <p:txEl>
+                                              <p:pRg st="1" end="1"/>
+                                            </p:txEl>
+                                          </p:spTgt>
+                                        </p:tgtEl>
+                                        <p:attrNameLst>
+                                          <p:attrName>style.visibility</p:attrName>
+                                        </p:attrNameLst>
+                                      </p:cBhvr>
+                                      <p:to>
+                                        <p:strVal val="visible"/>
+                                      </p:to>
+                                    </p:set>
+                                  </p:childTnLst>
+                                </p:cTn>
+                              </p:par>
+                            </p:childTnLst>
+                          </p:cTn>
+                        </p:par>
+                      </p:childTnLst>
+                    </p:cTn>
+                  </p:par>
+                  <p:par>
+                    <p:cTn id="11" fill="hold">
+                      <p:stCondLst>
+                        <p:cond delay="indefinite"/>
+                      </p:stCondLst>
+                      <p:childTnLst>
+                        <p:par>
+                          <p:cTn id="12" fill="hold">
+                            <p:stCondLst>
+                              <p:cond delay="0"/>
+                            </p:stCondLst>
+                            <p:childTnLst>
+                              <p:par>
+                                <p:cTn id="13" presetID="1" presetClass="entr" presetSubtype="0" fill="hold" nodeType="clickEffect">
+                                  <p:stCondLst>
+                                    <p:cond delay="0"/>
+                                  </p:stCondLst>
+                                  <p:childTnLst>
+                                    <p:set>
+                                      <p:cBhvr>
+                                        <p:cTn id="14" dur="1" fill="hold">
+                                          <p:stCondLst>
+                                            <p:cond delay="0"/>
+                                          </p:stCondLst>
+                                        </p:cTn>
+                                        <p:tgtEl>
+                                          <p:spTgt spid="3">
+                                            <p:txEl>
+                                              <p:pRg st="2" end="2"/>
+                                            </p:txEl>
+                                          </p:spTgt>
+                                        </p:tgtEl>
+                                        <p:attrNameLst>
+                                          <p:attrName>style.visibility</p:attrName>
+                                        </p:attrNameLst>
+                                      </p:cBhvr>
+                                      <p:to>
+                                        <p:strVal val="visible"/>
+                                      </p:to>
+                                    </p:set>
+                                  </p:childTnLst>
+                                </p:cTn>
+                              </p:par>
+                            </p:childTnLst>
+                          </p:cTn>
+                        </p:par>
+                      </p:childTnLst>
+                    </p:cTn>
+                  </p:par>
+                </p:childTnLst>
+              </p:cTn>
+              <p:prevCondLst>
+                <p:cond evt="onPrev" delay="0">
+                  <p:tgtEl>
+                    <p:sldTgt/>
+                  </p:tgtEl>
+                </p:cond>
+              </p:prevCondLst>
+              <p:nextCondLst>
+                <p:cond evt="onNext" delay="0">
+                  <p:tgtEl>
+                    <p:sldTgt/>
+                  </p:tgtEl>
+                </p:cond>
+              </p:nextCondLst>
+            </p:seq>
+          </p:childTnLst>
+        </p:cTn>
       </p:par>
     </p:tnLst>
   </p:timing>
@@ -4655,50 +4924,166 @@
         </p:nvSpPr>
         <p:spPr/>
         <p:txBody>
+          <a:bodyPr>
+            <a:normAutofit/>
+          </a:bodyPr>
+          <a:lstStyle/>
+          <a:p>
+            <a:r>
+              <a:rPr lang="en-US" dirty="0" err="1" smtClean="0"/>
+              <a:t>Lenguajes</a:t>
+            </a:r>
+            <a:r>
+              <a:rPr lang="en-US" dirty="0" smtClean="0"/>
+              <a:t> de </a:t>
+            </a:r>
+            <a:r>
+              <a:rPr lang="en-US" dirty="0" err="1" smtClean="0"/>
+              <a:t>programación</a:t>
+            </a:r>
+            <a:r>
+              <a:rPr lang="en-US" dirty="0" smtClean="0"/>
+              <a:t> -</a:t>
+            </a:r>
+            <a:r>
+              <a:rPr lang="en-US" dirty="0" err="1" smtClean="0"/>
+              <a:t>Historia</a:t>
+            </a:r>
+            <a:endParaRPr lang="en-US" dirty="0"/>
+          </a:p>
+        </p:txBody>
+      </p:sp>
+      <p:sp>
+        <p:nvSpPr>
+          <p:cNvPr id="3" name="Content Placeholder 2"/>
+          <p:cNvSpPr>
+            <a:spLocks noGrp="1"/>
+          </p:cNvSpPr>
+          <p:nvPr>
+            <p:ph idx="1"/>
+          </p:nvPr>
+        </p:nvSpPr>
+        <p:spPr/>
+        <p:txBody>
           <a:bodyPr/>
           <a:lstStyle/>
           <a:p>
             <a:r>
+              <a:rPr lang="en-US" dirty="0" smtClean="0"/>
+              <a:t>1890 – El </a:t>
+            </a:r>
+            <a:r>
               <a:rPr lang="en-US" dirty="0" err="1" smtClean="0"/>
-              <a:t>Algoritmo</a:t>
-            </a:r>
-            <a:endParaRPr lang="en-US" dirty="0"/>
-          </a:p>
-        </p:txBody>
-      </p:sp>
-      <p:sp>
-        <p:nvSpPr>
-          <p:cNvPr id="3" name="Content Placeholder 2"/>
-          <p:cNvSpPr>
-            <a:spLocks noGrp="1"/>
-          </p:cNvSpPr>
-          <p:nvPr>
-            <p:ph idx="1"/>
-          </p:nvPr>
-        </p:nvSpPr>
-        <p:spPr/>
-        <p:txBody>
-          <a:bodyPr/>
-          <a:lstStyle/>
-          <a:p>
-            <a:r>
-              <a:rPr lang="es-ES" dirty="0" smtClean="0"/>
-              <a:t>Es </a:t>
-            </a:r>
-            <a:r>
-              <a:rPr lang="es-ES" dirty="0"/>
-              <a:t>un conjunto prescrito de instrucciones o reglas bien definidas, ordenadas y finitas que permite llevar a cabo una actividad mediante pasos sucesivos que no generen dudas a quien deba hacer dicha </a:t>
-            </a:r>
-            <a:r>
-              <a:rPr lang="es-ES" dirty="0" smtClean="0"/>
-              <a:t>actividad</a:t>
-            </a:r>
-          </a:p>
-          <a:p>
-            <a:r>
-              <a:rPr lang="es-ES" dirty="0" smtClean="0"/>
-              <a:t>Ejemplos</a:t>
-            </a:r>
+              <a:t>censo</a:t>
+            </a:r>
+            <a:r>
+              <a:rPr lang="en-US" dirty="0" smtClean="0"/>
+              <a:t> de los EEUU </a:t>
+            </a:r>
+            <a:r>
+              <a:rPr lang="en-US" dirty="0" err="1" smtClean="0"/>
+              <a:t>fue</a:t>
+            </a:r>
+            <a:r>
+              <a:rPr lang="en-US" dirty="0" smtClean="0"/>
+              <a:t> </a:t>
+            </a:r>
+            <a:r>
+              <a:rPr lang="en-US" dirty="0" err="1" smtClean="0"/>
+              <a:t>codificado</a:t>
+            </a:r>
+            <a:r>
+              <a:rPr lang="en-US" dirty="0" smtClean="0"/>
+              <a:t> en </a:t>
+            </a:r>
+            <a:r>
+              <a:rPr lang="en-US" dirty="0" err="1" smtClean="0"/>
+              <a:t>tarjetas</a:t>
+            </a:r>
+            <a:r>
+              <a:rPr lang="en-US" dirty="0" smtClean="0"/>
+              <a:t> </a:t>
+            </a:r>
+            <a:r>
+              <a:rPr lang="en-US" dirty="0" err="1" smtClean="0"/>
+              <a:t>perforadas</a:t>
+            </a:r>
+            <a:endParaRPr lang="en-US" dirty="0" smtClean="0"/>
+          </a:p>
+          <a:p>
+            <a:r>
+              <a:rPr lang="en-US" dirty="0" err="1" smtClean="0"/>
+              <a:t>Máquinas</a:t>
+            </a:r>
+            <a:r>
+              <a:rPr lang="en-US" dirty="0" smtClean="0"/>
+              <a:t> de Turing 1936</a:t>
+            </a:r>
+          </a:p>
+          <a:p>
+            <a:r>
+              <a:rPr lang="en-US" dirty="0" err="1" smtClean="0"/>
+              <a:t>Arquitectura</a:t>
+            </a:r>
+            <a:r>
+              <a:rPr lang="en-US" dirty="0" smtClean="0"/>
+              <a:t> de von Neumann</a:t>
+            </a:r>
+          </a:p>
+          <a:p>
+            <a:r>
+              <a:rPr lang="en-US" dirty="0" err="1" smtClean="0"/>
+              <a:t>Lenguaje</a:t>
+            </a:r>
+            <a:r>
+              <a:rPr lang="en-US" dirty="0" smtClean="0"/>
+              <a:t> </a:t>
+            </a:r>
+            <a:r>
+              <a:rPr lang="en-US" dirty="0" err="1" smtClean="0"/>
+              <a:t>Ensamblador</a:t>
+            </a:r>
+            <a:r>
+              <a:rPr lang="en-US" dirty="0" smtClean="0"/>
+              <a:t> – 1940s</a:t>
+            </a:r>
+          </a:p>
+          <a:p>
+            <a:r>
+              <a:rPr lang="en-US" dirty="0" smtClean="0"/>
+              <a:t>FORTRAN – 1954</a:t>
+            </a:r>
+          </a:p>
+          <a:p>
+            <a:r>
+              <a:rPr lang="en-US" dirty="0" smtClean="0"/>
+              <a:t>COBOL – 1959</a:t>
+            </a:r>
+          </a:p>
+          <a:p>
+            <a:r>
+              <a:rPr lang="en-US" dirty="0" smtClean="0"/>
+              <a:t>C – 1972</a:t>
+            </a:r>
+          </a:p>
+          <a:p>
+            <a:r>
+              <a:rPr lang="en-US" dirty="0" smtClean="0"/>
+              <a:t>1980s – C++, Perl</a:t>
+            </a:r>
+          </a:p>
+          <a:p>
+            <a:r>
+              <a:rPr lang="en-US" dirty="0" smtClean="0"/>
+              <a:t>1990s – Python, VB, PHP, Java, JS, Ruby, </a:t>
+            </a:r>
+            <a:r>
+              <a:rPr lang="en-US" dirty="0" err="1" smtClean="0"/>
+              <a:t>etc</a:t>
+            </a:r>
+            <a:endParaRPr lang="en-US" dirty="0" smtClean="0"/>
+          </a:p>
+          <a:p>
             <a:endParaRPr lang="en-US" dirty="0"/>
           </a:p>
         </p:txBody>
@@ -4706,7 +5091,7 @@
     </p:spTree>
     <p:extLst>
       <p:ext uri="{BB962C8B-B14F-4D97-AF65-F5344CB8AC3E}">
-        <p14:creationId xmlns:p14="http://schemas.microsoft.com/office/powerpoint/2010/main" val="2866603582"/>
+        <p14:creationId xmlns:p14="http://schemas.microsoft.com/office/powerpoint/2010/main" val="3739150238"/>
       </p:ext>
     </p:extLst>
   </p:cSld>
@@ -4716,7 +5101,1252 @@
   <p:timing>
     <p:tnLst>
       <p:par>
-        <p:cTn id="1" dur="indefinite" restart="never" nodeType="tmRoot"/>
+        <p:cTn id="1" dur="indefinite" restart="never" nodeType="tmRoot">
+          <p:childTnLst>
+            <p:seq concurrent="1" nextAc="seek">
+              <p:cTn id="2" dur="indefinite" nodeType="mainSeq">
+                <p:childTnLst>
+                  <p:par>
+                    <p:cTn id="3" fill="hold">
+                      <p:stCondLst>
+                        <p:cond delay="indefinite"/>
+                      </p:stCondLst>
+                      <p:childTnLst>
+                        <p:par>
+                          <p:cTn id="4" fill="hold">
+                            <p:stCondLst>
+                              <p:cond delay="0"/>
+                            </p:stCondLst>
+                            <p:childTnLst>
+                              <p:par>
+                                <p:cTn id="5" presetID="1" presetClass="entr" presetSubtype="0" fill="hold" nodeType="clickEffect">
+                                  <p:stCondLst>
+                                    <p:cond delay="0"/>
+                                  </p:stCondLst>
+                                  <p:childTnLst>
+                                    <p:set>
+                                      <p:cBhvr>
+                                        <p:cTn id="6" dur="1" fill="hold">
+                                          <p:stCondLst>
+                                            <p:cond delay="0"/>
+                                          </p:stCondLst>
+                                        </p:cTn>
+                                        <p:tgtEl>
+                                          <p:spTgt spid="3">
+                                            <p:txEl>
+                                              <p:pRg st="0" end="0"/>
+                                            </p:txEl>
+                                          </p:spTgt>
+                                        </p:tgtEl>
+                                        <p:attrNameLst>
+                                          <p:attrName>style.visibility</p:attrName>
+                                        </p:attrNameLst>
+                                      </p:cBhvr>
+                                      <p:to>
+                                        <p:strVal val="visible"/>
+                                      </p:to>
+                                    </p:set>
+                                  </p:childTnLst>
+                                </p:cTn>
+                              </p:par>
+                            </p:childTnLst>
+                          </p:cTn>
+                        </p:par>
+                      </p:childTnLst>
+                    </p:cTn>
+                  </p:par>
+                  <p:par>
+                    <p:cTn id="7" fill="hold">
+                      <p:stCondLst>
+                        <p:cond delay="indefinite"/>
+                      </p:stCondLst>
+                      <p:childTnLst>
+                        <p:par>
+                          <p:cTn id="8" fill="hold">
+                            <p:stCondLst>
+                              <p:cond delay="0"/>
+                            </p:stCondLst>
+                            <p:childTnLst>
+                              <p:par>
+                                <p:cTn id="9" presetID="1" presetClass="entr" presetSubtype="0" fill="hold" nodeType="clickEffect">
+                                  <p:stCondLst>
+                                    <p:cond delay="0"/>
+                                  </p:stCondLst>
+                                  <p:childTnLst>
+                                    <p:set>
+                                      <p:cBhvr>
+                                        <p:cTn id="10" dur="1" fill="hold">
+                                          <p:stCondLst>
+                                            <p:cond delay="0"/>
+                                          </p:stCondLst>
+                                        </p:cTn>
+                                        <p:tgtEl>
+                                          <p:spTgt spid="3">
+                                            <p:txEl>
+                                              <p:pRg st="1" end="1"/>
+                                            </p:txEl>
+                                          </p:spTgt>
+                                        </p:tgtEl>
+                                        <p:attrNameLst>
+                                          <p:attrName>style.visibility</p:attrName>
+                                        </p:attrNameLst>
+                                      </p:cBhvr>
+                                      <p:to>
+                                        <p:strVal val="visible"/>
+                                      </p:to>
+                                    </p:set>
+                                  </p:childTnLst>
+                                </p:cTn>
+                              </p:par>
+                            </p:childTnLst>
+                          </p:cTn>
+                        </p:par>
+                      </p:childTnLst>
+                    </p:cTn>
+                  </p:par>
+                  <p:par>
+                    <p:cTn id="11" fill="hold">
+                      <p:stCondLst>
+                        <p:cond delay="indefinite"/>
+                      </p:stCondLst>
+                      <p:childTnLst>
+                        <p:par>
+                          <p:cTn id="12" fill="hold">
+                            <p:stCondLst>
+                              <p:cond delay="0"/>
+                            </p:stCondLst>
+                            <p:childTnLst>
+                              <p:par>
+                                <p:cTn id="13" presetID="1" presetClass="entr" presetSubtype="0" fill="hold" nodeType="clickEffect">
+                                  <p:stCondLst>
+                                    <p:cond delay="0"/>
+                                  </p:stCondLst>
+                                  <p:childTnLst>
+                                    <p:set>
+                                      <p:cBhvr>
+                                        <p:cTn id="14" dur="1" fill="hold">
+                                          <p:stCondLst>
+                                            <p:cond delay="0"/>
+                                          </p:stCondLst>
+                                        </p:cTn>
+                                        <p:tgtEl>
+                                          <p:spTgt spid="3">
+                                            <p:txEl>
+                                              <p:pRg st="2" end="2"/>
+                                            </p:txEl>
+                                          </p:spTgt>
+                                        </p:tgtEl>
+                                        <p:attrNameLst>
+                                          <p:attrName>style.visibility</p:attrName>
+                                        </p:attrNameLst>
+                                      </p:cBhvr>
+                                      <p:to>
+                                        <p:strVal val="visible"/>
+                                      </p:to>
+                                    </p:set>
+                                  </p:childTnLst>
+                                </p:cTn>
+                              </p:par>
+                            </p:childTnLst>
+                          </p:cTn>
+                        </p:par>
+                      </p:childTnLst>
+                    </p:cTn>
+                  </p:par>
+                  <p:par>
+                    <p:cTn id="15" fill="hold">
+                      <p:stCondLst>
+                        <p:cond delay="indefinite"/>
+                      </p:stCondLst>
+                      <p:childTnLst>
+                        <p:par>
+                          <p:cTn id="16" fill="hold">
+                            <p:stCondLst>
+                              <p:cond delay="0"/>
+                            </p:stCondLst>
+                            <p:childTnLst>
+                              <p:par>
+                                <p:cTn id="17" presetID="1" presetClass="entr" presetSubtype="0" fill="hold" nodeType="clickEffect">
+                                  <p:stCondLst>
+                                    <p:cond delay="0"/>
+                                  </p:stCondLst>
+                                  <p:childTnLst>
+                                    <p:set>
+                                      <p:cBhvr>
+                                        <p:cTn id="18" dur="1" fill="hold">
+                                          <p:stCondLst>
+                                            <p:cond delay="0"/>
+                                          </p:stCondLst>
+                                        </p:cTn>
+                                        <p:tgtEl>
+                                          <p:spTgt spid="3">
+                                            <p:txEl>
+                                              <p:pRg st="3" end="3"/>
+                                            </p:txEl>
+                                          </p:spTgt>
+                                        </p:tgtEl>
+                                        <p:attrNameLst>
+                                          <p:attrName>style.visibility</p:attrName>
+                                        </p:attrNameLst>
+                                      </p:cBhvr>
+                                      <p:to>
+                                        <p:strVal val="visible"/>
+                                      </p:to>
+                                    </p:set>
+                                  </p:childTnLst>
+                                </p:cTn>
+                              </p:par>
+                            </p:childTnLst>
+                          </p:cTn>
+                        </p:par>
+                      </p:childTnLst>
+                    </p:cTn>
+                  </p:par>
+                  <p:par>
+                    <p:cTn id="19" fill="hold">
+                      <p:stCondLst>
+                        <p:cond delay="indefinite"/>
+                      </p:stCondLst>
+                      <p:childTnLst>
+                        <p:par>
+                          <p:cTn id="20" fill="hold">
+                            <p:stCondLst>
+                              <p:cond delay="0"/>
+                            </p:stCondLst>
+                            <p:childTnLst>
+                              <p:par>
+                                <p:cTn id="21" presetID="1" presetClass="entr" presetSubtype="0" fill="hold" nodeType="clickEffect">
+                                  <p:stCondLst>
+                                    <p:cond delay="0"/>
+                                  </p:stCondLst>
+                                  <p:childTnLst>
+                                    <p:set>
+                                      <p:cBhvr>
+                                        <p:cTn id="22" dur="1" fill="hold">
+                                          <p:stCondLst>
+                                            <p:cond delay="0"/>
+                                          </p:stCondLst>
+                                        </p:cTn>
+                                        <p:tgtEl>
+                                          <p:spTgt spid="3">
+                                            <p:txEl>
+                                              <p:pRg st="4" end="4"/>
+                                            </p:txEl>
+                                          </p:spTgt>
+                                        </p:tgtEl>
+                                        <p:attrNameLst>
+                                          <p:attrName>style.visibility</p:attrName>
+                                        </p:attrNameLst>
+                                      </p:cBhvr>
+                                      <p:to>
+                                        <p:strVal val="visible"/>
+                                      </p:to>
+                                    </p:set>
+                                  </p:childTnLst>
+                                </p:cTn>
+                              </p:par>
+                            </p:childTnLst>
+                          </p:cTn>
+                        </p:par>
+                      </p:childTnLst>
+                    </p:cTn>
+                  </p:par>
+                  <p:par>
+                    <p:cTn id="23" fill="hold">
+                      <p:stCondLst>
+                        <p:cond delay="indefinite"/>
+                      </p:stCondLst>
+                      <p:childTnLst>
+                        <p:par>
+                          <p:cTn id="24" fill="hold">
+                            <p:stCondLst>
+                              <p:cond delay="0"/>
+                            </p:stCondLst>
+                            <p:childTnLst>
+                              <p:par>
+                                <p:cTn id="25" presetID="1" presetClass="entr" presetSubtype="0" fill="hold" nodeType="clickEffect">
+                                  <p:stCondLst>
+                                    <p:cond delay="0"/>
+                                  </p:stCondLst>
+                                  <p:childTnLst>
+                                    <p:set>
+                                      <p:cBhvr>
+                                        <p:cTn id="26" dur="1" fill="hold">
+                                          <p:stCondLst>
+                                            <p:cond delay="0"/>
+                                          </p:stCondLst>
+                                        </p:cTn>
+                                        <p:tgtEl>
+                                          <p:spTgt spid="3">
+                                            <p:txEl>
+                                              <p:pRg st="5" end="5"/>
+                                            </p:txEl>
+                                          </p:spTgt>
+                                        </p:tgtEl>
+                                        <p:attrNameLst>
+                                          <p:attrName>style.visibility</p:attrName>
+                                        </p:attrNameLst>
+                                      </p:cBhvr>
+                                      <p:to>
+                                        <p:strVal val="visible"/>
+                                      </p:to>
+                                    </p:set>
+                                  </p:childTnLst>
+                                </p:cTn>
+                              </p:par>
+                            </p:childTnLst>
+                          </p:cTn>
+                        </p:par>
+                      </p:childTnLst>
+                    </p:cTn>
+                  </p:par>
+                  <p:par>
+                    <p:cTn id="27" fill="hold">
+                      <p:stCondLst>
+                        <p:cond delay="indefinite"/>
+                      </p:stCondLst>
+                      <p:childTnLst>
+                        <p:par>
+                          <p:cTn id="28" fill="hold">
+                            <p:stCondLst>
+                              <p:cond delay="0"/>
+                            </p:stCondLst>
+                            <p:childTnLst>
+                              <p:par>
+                                <p:cTn id="29" presetID="1" presetClass="entr" presetSubtype="0" fill="hold" nodeType="clickEffect">
+                                  <p:stCondLst>
+                                    <p:cond delay="0"/>
+                                  </p:stCondLst>
+                                  <p:childTnLst>
+                                    <p:set>
+                                      <p:cBhvr>
+                                        <p:cTn id="30" dur="1" fill="hold">
+                                          <p:stCondLst>
+                                            <p:cond delay="0"/>
+                                          </p:stCondLst>
+                                        </p:cTn>
+                                        <p:tgtEl>
+                                          <p:spTgt spid="3">
+                                            <p:txEl>
+                                              <p:pRg st="6" end="6"/>
+                                            </p:txEl>
+                                          </p:spTgt>
+                                        </p:tgtEl>
+                                        <p:attrNameLst>
+                                          <p:attrName>style.visibility</p:attrName>
+                                        </p:attrNameLst>
+                                      </p:cBhvr>
+                                      <p:to>
+                                        <p:strVal val="visible"/>
+                                      </p:to>
+                                    </p:set>
+                                  </p:childTnLst>
+                                </p:cTn>
+                              </p:par>
+                            </p:childTnLst>
+                          </p:cTn>
+                        </p:par>
+                      </p:childTnLst>
+                    </p:cTn>
+                  </p:par>
+                  <p:par>
+                    <p:cTn id="31" fill="hold">
+                      <p:stCondLst>
+                        <p:cond delay="indefinite"/>
+                      </p:stCondLst>
+                      <p:childTnLst>
+                        <p:par>
+                          <p:cTn id="32" fill="hold">
+                            <p:stCondLst>
+                              <p:cond delay="0"/>
+                            </p:stCondLst>
+                            <p:childTnLst>
+                              <p:par>
+                                <p:cTn id="33" presetID="1" presetClass="entr" presetSubtype="0" fill="hold" nodeType="clickEffect">
+                                  <p:stCondLst>
+                                    <p:cond delay="0"/>
+                                  </p:stCondLst>
+                                  <p:childTnLst>
+                                    <p:set>
+                                      <p:cBhvr>
+                                        <p:cTn id="34" dur="1" fill="hold">
+                                          <p:stCondLst>
+                                            <p:cond delay="0"/>
+                                          </p:stCondLst>
+                                        </p:cTn>
+                                        <p:tgtEl>
+                                          <p:spTgt spid="3">
+                                            <p:txEl>
+                                              <p:pRg st="7" end="7"/>
+                                            </p:txEl>
+                                          </p:spTgt>
+                                        </p:tgtEl>
+                                        <p:attrNameLst>
+                                          <p:attrName>style.visibility</p:attrName>
+                                        </p:attrNameLst>
+                                      </p:cBhvr>
+                                      <p:to>
+                                        <p:strVal val="visible"/>
+                                      </p:to>
+                                    </p:set>
+                                  </p:childTnLst>
+                                </p:cTn>
+                              </p:par>
+                            </p:childTnLst>
+                          </p:cTn>
+                        </p:par>
+                      </p:childTnLst>
+                    </p:cTn>
+                  </p:par>
+                  <p:par>
+                    <p:cTn id="35" fill="hold">
+                      <p:stCondLst>
+                        <p:cond delay="indefinite"/>
+                      </p:stCondLst>
+                      <p:childTnLst>
+                        <p:par>
+                          <p:cTn id="36" fill="hold">
+                            <p:stCondLst>
+                              <p:cond delay="0"/>
+                            </p:stCondLst>
+                            <p:childTnLst>
+                              <p:par>
+                                <p:cTn id="37" presetID="1" presetClass="entr" presetSubtype="0" fill="hold" nodeType="clickEffect">
+                                  <p:stCondLst>
+                                    <p:cond delay="0"/>
+                                  </p:stCondLst>
+                                  <p:childTnLst>
+                                    <p:set>
+                                      <p:cBhvr>
+                                        <p:cTn id="38" dur="1" fill="hold">
+                                          <p:stCondLst>
+                                            <p:cond delay="0"/>
+                                          </p:stCondLst>
+                                        </p:cTn>
+                                        <p:tgtEl>
+                                          <p:spTgt spid="3">
+                                            <p:txEl>
+                                              <p:pRg st="8" end="8"/>
+                                            </p:txEl>
+                                          </p:spTgt>
+                                        </p:tgtEl>
+                                        <p:attrNameLst>
+                                          <p:attrName>style.visibility</p:attrName>
+                                        </p:attrNameLst>
+                                      </p:cBhvr>
+                                      <p:to>
+                                        <p:strVal val="visible"/>
+                                      </p:to>
+                                    </p:set>
+                                  </p:childTnLst>
+                                </p:cTn>
+                              </p:par>
+                            </p:childTnLst>
+                          </p:cTn>
+                        </p:par>
+                      </p:childTnLst>
+                    </p:cTn>
+                  </p:par>
+                </p:childTnLst>
+              </p:cTn>
+              <p:prevCondLst>
+                <p:cond evt="onPrev" delay="0">
+                  <p:tgtEl>
+                    <p:sldTgt/>
+                  </p:tgtEl>
+                </p:cond>
+              </p:prevCondLst>
+              <p:nextCondLst>
+                <p:cond evt="onNext" delay="0">
+                  <p:tgtEl>
+                    <p:sldTgt/>
+                  </p:tgtEl>
+                </p:cond>
+              </p:nextCondLst>
+            </p:seq>
+          </p:childTnLst>
+        </p:cTn>
+      </p:par>
+    </p:tnLst>
+  </p:timing>
+</p:sld>
+</file>
+
+<file path=ppt/slides/slide8.xml><?xml version="1.0" encoding="utf-8"?>
+<p:sld xmlns:a="http://schemas.openxmlformats.org/drawingml/2006/main" xmlns:r="http://schemas.openxmlformats.org/officeDocument/2006/relationships" xmlns:p="http://schemas.openxmlformats.org/presentationml/2006/main">
+  <p:cSld>
+    <p:spTree>
+      <p:nvGrpSpPr>
+        <p:cNvPr id="1" name=""/>
+        <p:cNvGrpSpPr/>
+        <p:nvPr/>
+      </p:nvGrpSpPr>
+      <p:grpSpPr>
+        <a:xfrm>
+          <a:off x="0" y="0"/>
+          <a:ext cx="0" cy="0"/>
+          <a:chOff x="0" y="0"/>
+          <a:chExt cx="0" cy="0"/>
+        </a:xfrm>
+      </p:grpSpPr>
+      <p:sp>
+        <p:nvSpPr>
+          <p:cNvPr id="2" name="Title 1"/>
+          <p:cNvSpPr>
+            <a:spLocks noGrp="1"/>
+          </p:cNvSpPr>
+          <p:nvPr>
+            <p:ph type="title"/>
+          </p:nvPr>
+        </p:nvSpPr>
+        <p:spPr/>
+        <p:txBody>
+          <a:bodyPr/>
+          <a:lstStyle/>
+          <a:p>
+            <a:r>
+              <a:rPr lang="en-US" dirty="0" err="1" smtClean="0"/>
+              <a:t>Lenguajes</a:t>
+            </a:r>
+            <a:r>
+              <a:rPr lang="en-US" dirty="0" smtClean="0"/>
+              <a:t> de </a:t>
+            </a:r>
+            <a:r>
+              <a:rPr lang="en-US" dirty="0" err="1" smtClean="0"/>
+              <a:t>programación</a:t>
+            </a:r>
+            <a:endParaRPr lang="en-US" dirty="0"/>
+          </a:p>
+        </p:txBody>
+      </p:sp>
+      <p:sp>
+        <p:nvSpPr>
+          <p:cNvPr id="3" name="Content Placeholder 2"/>
+          <p:cNvSpPr>
+            <a:spLocks noGrp="1"/>
+          </p:cNvSpPr>
+          <p:nvPr>
+            <p:ph idx="1"/>
+          </p:nvPr>
+        </p:nvSpPr>
+        <p:spPr/>
+        <p:txBody>
+          <a:bodyPr/>
+          <a:lstStyle/>
+          <a:p>
+            <a:r>
+              <a:rPr lang="es-ES" dirty="0"/>
+              <a:t>El lenguaje de programación es un idioma artificial diseñado para expresar procesos que pueden ser llevados a cabo por </a:t>
+            </a:r>
+            <a:r>
+              <a:rPr lang="es-ES" dirty="0" smtClean="0"/>
+              <a:t>máquinas.</a:t>
+            </a:r>
+          </a:p>
+          <a:p>
+            <a:r>
+              <a:rPr lang="es-ES" dirty="0" smtClean="0"/>
+              <a:t>Los lenguajes de programación usan variables y palabras reservadas para lograr que la máquina haga lo que le decimos que haga.</a:t>
+            </a:r>
+            <a:endParaRPr lang="en-US" dirty="0"/>
+          </a:p>
+        </p:txBody>
+      </p:sp>
+    </p:spTree>
+    <p:extLst>
+      <p:ext uri="{BB962C8B-B14F-4D97-AF65-F5344CB8AC3E}">
+        <p14:creationId xmlns:p14="http://schemas.microsoft.com/office/powerpoint/2010/main" val="452538763"/>
+      </p:ext>
+    </p:extLst>
+  </p:cSld>
+  <p:clrMapOvr>
+    <a:masterClrMapping/>
+  </p:clrMapOvr>
+  <p:timing>
+    <p:tnLst>
+      <p:par>
+        <p:cTn id="1" dur="indefinite" restart="never" nodeType="tmRoot">
+          <p:childTnLst>
+            <p:seq concurrent="1" nextAc="seek">
+              <p:cTn id="2" dur="indefinite" nodeType="mainSeq">
+                <p:childTnLst>
+                  <p:par>
+                    <p:cTn id="3" fill="hold">
+                      <p:stCondLst>
+                        <p:cond delay="indefinite"/>
+                      </p:stCondLst>
+                      <p:childTnLst>
+                        <p:par>
+                          <p:cTn id="4" fill="hold">
+                            <p:stCondLst>
+                              <p:cond delay="0"/>
+                            </p:stCondLst>
+                            <p:childTnLst>
+                              <p:par>
+                                <p:cTn id="5" presetID="1" presetClass="entr" presetSubtype="0" fill="hold" nodeType="clickEffect">
+                                  <p:stCondLst>
+                                    <p:cond delay="0"/>
+                                  </p:stCondLst>
+                                  <p:childTnLst>
+                                    <p:set>
+                                      <p:cBhvr>
+                                        <p:cTn id="6" dur="1" fill="hold">
+                                          <p:stCondLst>
+                                            <p:cond delay="0"/>
+                                          </p:stCondLst>
+                                        </p:cTn>
+                                        <p:tgtEl>
+                                          <p:spTgt spid="3">
+                                            <p:txEl>
+                                              <p:pRg st="0" end="0"/>
+                                            </p:txEl>
+                                          </p:spTgt>
+                                        </p:tgtEl>
+                                        <p:attrNameLst>
+                                          <p:attrName>style.visibility</p:attrName>
+                                        </p:attrNameLst>
+                                      </p:cBhvr>
+                                      <p:to>
+                                        <p:strVal val="visible"/>
+                                      </p:to>
+                                    </p:set>
+                                  </p:childTnLst>
+                                </p:cTn>
+                              </p:par>
+                            </p:childTnLst>
+                          </p:cTn>
+                        </p:par>
+                      </p:childTnLst>
+                    </p:cTn>
+                  </p:par>
+                  <p:par>
+                    <p:cTn id="7" fill="hold">
+                      <p:stCondLst>
+                        <p:cond delay="indefinite"/>
+                      </p:stCondLst>
+                      <p:childTnLst>
+                        <p:par>
+                          <p:cTn id="8" fill="hold">
+                            <p:stCondLst>
+                              <p:cond delay="0"/>
+                            </p:stCondLst>
+                            <p:childTnLst>
+                              <p:par>
+                                <p:cTn id="9" presetID="1" presetClass="entr" presetSubtype="0" fill="hold" nodeType="clickEffect">
+                                  <p:stCondLst>
+                                    <p:cond delay="0"/>
+                                  </p:stCondLst>
+                                  <p:childTnLst>
+                                    <p:set>
+                                      <p:cBhvr>
+                                        <p:cTn id="10" dur="1" fill="hold">
+                                          <p:stCondLst>
+                                            <p:cond delay="0"/>
+                                          </p:stCondLst>
+                                        </p:cTn>
+                                        <p:tgtEl>
+                                          <p:spTgt spid="3">
+                                            <p:txEl>
+                                              <p:pRg st="1" end="1"/>
+                                            </p:txEl>
+                                          </p:spTgt>
+                                        </p:tgtEl>
+                                        <p:attrNameLst>
+                                          <p:attrName>style.visibility</p:attrName>
+                                        </p:attrNameLst>
+                                      </p:cBhvr>
+                                      <p:to>
+                                        <p:strVal val="visible"/>
+                                      </p:to>
+                                    </p:set>
+                                  </p:childTnLst>
+                                </p:cTn>
+                              </p:par>
+                            </p:childTnLst>
+                          </p:cTn>
+                        </p:par>
+                      </p:childTnLst>
+                    </p:cTn>
+                  </p:par>
+                </p:childTnLst>
+              </p:cTn>
+              <p:prevCondLst>
+                <p:cond evt="onPrev" delay="0">
+                  <p:tgtEl>
+                    <p:sldTgt/>
+                  </p:tgtEl>
+                </p:cond>
+              </p:prevCondLst>
+              <p:nextCondLst>
+                <p:cond evt="onNext" delay="0">
+                  <p:tgtEl>
+                    <p:sldTgt/>
+                  </p:tgtEl>
+                </p:cond>
+              </p:nextCondLst>
+            </p:seq>
+          </p:childTnLst>
+        </p:cTn>
+      </p:par>
+    </p:tnLst>
+  </p:timing>
+</p:sld>
+</file>
+
+<file path=ppt/slides/slide9.xml><?xml version="1.0" encoding="utf-8"?>
+<p:sld xmlns:a="http://schemas.openxmlformats.org/drawingml/2006/main" xmlns:r="http://schemas.openxmlformats.org/officeDocument/2006/relationships" xmlns:p="http://schemas.openxmlformats.org/presentationml/2006/main">
+  <p:cSld>
+    <p:spTree>
+      <p:nvGrpSpPr>
+        <p:cNvPr id="1" name=""/>
+        <p:cNvGrpSpPr/>
+        <p:nvPr/>
+      </p:nvGrpSpPr>
+      <p:grpSpPr>
+        <a:xfrm>
+          <a:off x="0" y="0"/>
+          <a:ext cx="0" cy="0"/>
+          <a:chOff x="0" y="0"/>
+          <a:chExt cx="0" cy="0"/>
+        </a:xfrm>
+      </p:grpSpPr>
+      <p:sp>
+        <p:nvSpPr>
+          <p:cNvPr id="2" name="Title 1"/>
+          <p:cNvSpPr>
+            <a:spLocks noGrp="1"/>
+          </p:cNvSpPr>
+          <p:nvPr>
+            <p:ph type="title"/>
+          </p:nvPr>
+        </p:nvSpPr>
+        <p:spPr/>
+        <p:txBody>
+          <a:bodyPr/>
+          <a:lstStyle/>
+          <a:p>
+            <a:r>
+              <a:rPr lang="en-US" dirty="0" err="1" smtClean="0"/>
+              <a:t>Lenguajes</a:t>
+            </a:r>
+            <a:r>
+              <a:rPr lang="en-US" dirty="0" smtClean="0"/>
+              <a:t> de </a:t>
+            </a:r>
+            <a:r>
+              <a:rPr lang="en-US" dirty="0" err="1" smtClean="0"/>
+              <a:t>programación</a:t>
+            </a:r>
+            <a:endParaRPr lang="en-US" dirty="0"/>
+          </a:p>
+        </p:txBody>
+      </p:sp>
+      <p:sp>
+        <p:nvSpPr>
+          <p:cNvPr id="3" name="Content Placeholder 2"/>
+          <p:cNvSpPr>
+            <a:spLocks noGrp="1"/>
+          </p:cNvSpPr>
+          <p:nvPr>
+            <p:ph idx="1"/>
+          </p:nvPr>
+        </p:nvSpPr>
+        <p:spPr/>
+        <p:txBody>
+          <a:bodyPr/>
+          <a:lstStyle/>
+          <a:p>
+            <a:r>
+              <a:rPr lang="en-US" dirty="0" err="1" smtClean="0"/>
+              <a:t>Lenguajes</a:t>
+            </a:r>
+            <a:r>
+              <a:rPr lang="en-US" dirty="0" smtClean="0"/>
+              <a:t> de </a:t>
+            </a:r>
+            <a:r>
+              <a:rPr lang="en-US" dirty="0" err="1" smtClean="0"/>
+              <a:t>bajo</a:t>
+            </a:r>
+            <a:r>
+              <a:rPr lang="en-US" dirty="0" smtClean="0"/>
+              <a:t> </a:t>
+            </a:r>
+            <a:r>
+              <a:rPr lang="en-US" dirty="0" err="1" smtClean="0"/>
+              <a:t>nivel</a:t>
+            </a:r>
+            <a:r>
+              <a:rPr lang="en-US" dirty="0" smtClean="0"/>
+              <a:t> </a:t>
+            </a:r>
+          </a:p>
+          <a:p>
+            <a:pPr lvl="1"/>
+            <a:r>
+              <a:rPr lang="en-US" dirty="0" err="1" smtClean="0"/>
+              <a:t>Ensamblador</a:t>
+            </a:r>
+            <a:endParaRPr lang="en-US" dirty="0"/>
+          </a:p>
+          <a:p>
+            <a:r>
+              <a:rPr lang="en-US" dirty="0" err="1" smtClean="0"/>
+              <a:t>Lenguajes</a:t>
+            </a:r>
+            <a:r>
+              <a:rPr lang="en-US" dirty="0" smtClean="0"/>
+              <a:t> de alto </a:t>
+            </a:r>
+            <a:r>
+              <a:rPr lang="en-US" dirty="0" err="1" smtClean="0"/>
+              <a:t>nivel</a:t>
+            </a:r>
+            <a:endParaRPr lang="en-US" dirty="0" smtClean="0"/>
+          </a:p>
+          <a:p>
+            <a:pPr lvl="1"/>
+            <a:r>
+              <a:rPr lang="en-US" dirty="0" err="1" smtClean="0"/>
+              <a:t>Compilados</a:t>
+            </a:r>
+            <a:r>
+              <a:rPr lang="en-US" dirty="0" smtClean="0"/>
+              <a:t> –C, C++, C#, Visual</a:t>
+            </a:r>
+          </a:p>
+          <a:p>
+            <a:pPr lvl="1"/>
+            <a:r>
+              <a:rPr lang="en-US" dirty="0" err="1" smtClean="0"/>
+              <a:t>Interpretados</a:t>
+            </a:r>
+            <a:r>
+              <a:rPr lang="en-US" dirty="0" smtClean="0"/>
+              <a:t> – </a:t>
+            </a:r>
+            <a:r>
+              <a:rPr lang="en-US" dirty="0" err="1" smtClean="0"/>
+              <a:t>Javascript</a:t>
+            </a:r>
+            <a:r>
+              <a:rPr lang="en-US" dirty="0" smtClean="0"/>
+              <a:t>, PHP</a:t>
+            </a:r>
+          </a:p>
+          <a:p>
+            <a:r>
+              <a:rPr lang="en-US" dirty="0" err="1" smtClean="0"/>
+              <a:t>Caso</a:t>
+            </a:r>
+            <a:r>
+              <a:rPr lang="en-US" dirty="0" smtClean="0"/>
+              <a:t> especial: Java</a:t>
+            </a:r>
+          </a:p>
+          <a:p>
+            <a:pPr lvl="1"/>
+            <a:r>
+              <a:rPr lang="en-US" dirty="0" err="1" smtClean="0"/>
+              <a:t>Interpretado</a:t>
+            </a:r>
+            <a:r>
+              <a:rPr lang="en-US" dirty="0" smtClean="0"/>
+              <a:t> y </a:t>
+            </a:r>
+            <a:r>
+              <a:rPr lang="en-US" dirty="0" err="1" smtClean="0"/>
+              <a:t>compilado</a:t>
+            </a:r>
+            <a:r>
+              <a:rPr lang="en-US" dirty="0" smtClean="0"/>
+              <a:t> - JVM</a:t>
+            </a:r>
+            <a:endParaRPr lang="en-US" dirty="0"/>
+          </a:p>
+        </p:txBody>
+      </p:sp>
+    </p:spTree>
+    <p:extLst>
+      <p:ext uri="{BB962C8B-B14F-4D97-AF65-F5344CB8AC3E}">
+        <p14:creationId xmlns:p14="http://schemas.microsoft.com/office/powerpoint/2010/main" val="1855050687"/>
+      </p:ext>
+    </p:extLst>
+  </p:cSld>
+  <p:clrMapOvr>
+    <a:masterClrMapping/>
+  </p:clrMapOvr>
+  <p:timing>
+    <p:tnLst>
+      <p:par>
+        <p:cTn id="1" dur="indefinite" restart="never" nodeType="tmRoot">
+          <p:childTnLst>
+            <p:seq concurrent="1" nextAc="seek">
+              <p:cTn id="2" dur="indefinite" nodeType="mainSeq">
+                <p:childTnLst>
+                  <p:par>
+                    <p:cTn id="3" fill="hold">
+                      <p:stCondLst>
+                        <p:cond delay="indefinite"/>
+                      </p:stCondLst>
+                      <p:childTnLst>
+                        <p:par>
+                          <p:cTn id="4" fill="hold">
+                            <p:stCondLst>
+                              <p:cond delay="0"/>
+                            </p:stCondLst>
+                            <p:childTnLst>
+                              <p:par>
+                                <p:cTn id="5" presetID="1" presetClass="entr" presetSubtype="0" fill="hold" nodeType="clickEffect">
+                                  <p:stCondLst>
+                                    <p:cond delay="0"/>
+                                  </p:stCondLst>
+                                  <p:childTnLst>
+                                    <p:set>
+                                      <p:cBhvr>
+                                        <p:cTn id="6" dur="1" fill="hold">
+                                          <p:stCondLst>
+                                            <p:cond delay="0"/>
+                                          </p:stCondLst>
+                                        </p:cTn>
+                                        <p:tgtEl>
+                                          <p:spTgt spid="3">
+                                            <p:txEl>
+                                              <p:pRg st="0" end="0"/>
+                                            </p:txEl>
+                                          </p:spTgt>
+                                        </p:tgtEl>
+                                        <p:attrNameLst>
+                                          <p:attrName>style.visibility</p:attrName>
+                                        </p:attrNameLst>
+                                      </p:cBhvr>
+                                      <p:to>
+                                        <p:strVal val="visible"/>
+                                      </p:to>
+                                    </p:set>
+                                  </p:childTnLst>
+                                </p:cTn>
+                              </p:par>
+                            </p:childTnLst>
+                          </p:cTn>
+                        </p:par>
+                      </p:childTnLst>
+                    </p:cTn>
+                  </p:par>
+                  <p:par>
+                    <p:cTn id="7" fill="hold">
+                      <p:stCondLst>
+                        <p:cond delay="indefinite"/>
+                      </p:stCondLst>
+                      <p:childTnLst>
+                        <p:par>
+                          <p:cTn id="8" fill="hold">
+                            <p:stCondLst>
+                              <p:cond delay="0"/>
+                            </p:stCondLst>
+                            <p:childTnLst>
+                              <p:par>
+                                <p:cTn id="9" presetID="1" presetClass="entr" presetSubtype="0" fill="hold" nodeType="clickEffect">
+                                  <p:stCondLst>
+                                    <p:cond delay="0"/>
+                                  </p:stCondLst>
+                                  <p:childTnLst>
+                                    <p:set>
+                                      <p:cBhvr>
+                                        <p:cTn id="10" dur="1" fill="hold">
+                                          <p:stCondLst>
+                                            <p:cond delay="0"/>
+                                          </p:stCondLst>
+                                        </p:cTn>
+                                        <p:tgtEl>
+                                          <p:spTgt spid="3">
+                                            <p:txEl>
+                                              <p:pRg st="1" end="1"/>
+                                            </p:txEl>
+                                          </p:spTgt>
+                                        </p:tgtEl>
+                                        <p:attrNameLst>
+                                          <p:attrName>style.visibility</p:attrName>
+                                        </p:attrNameLst>
+                                      </p:cBhvr>
+                                      <p:to>
+                                        <p:strVal val="visible"/>
+                                      </p:to>
+                                    </p:set>
+                                  </p:childTnLst>
+                                </p:cTn>
+                              </p:par>
+                            </p:childTnLst>
+                          </p:cTn>
+                        </p:par>
+                      </p:childTnLst>
+                    </p:cTn>
+                  </p:par>
+                  <p:par>
+                    <p:cTn id="11" fill="hold">
+                      <p:stCondLst>
+                        <p:cond delay="indefinite"/>
+                      </p:stCondLst>
+                      <p:childTnLst>
+                        <p:par>
+                          <p:cTn id="12" fill="hold">
+                            <p:stCondLst>
+                              <p:cond delay="0"/>
+                            </p:stCondLst>
+                            <p:childTnLst>
+                              <p:par>
+                                <p:cTn id="13" presetID="1" presetClass="entr" presetSubtype="0" fill="hold" nodeType="clickEffect">
+                                  <p:stCondLst>
+                                    <p:cond delay="0"/>
+                                  </p:stCondLst>
+                                  <p:childTnLst>
+                                    <p:set>
+                                      <p:cBhvr>
+                                        <p:cTn id="14" dur="1" fill="hold">
+                                          <p:stCondLst>
+                                            <p:cond delay="0"/>
+                                          </p:stCondLst>
+                                        </p:cTn>
+                                        <p:tgtEl>
+                                          <p:spTgt spid="3">
+                                            <p:txEl>
+                                              <p:pRg st="2" end="2"/>
+                                            </p:txEl>
+                                          </p:spTgt>
+                                        </p:tgtEl>
+                                        <p:attrNameLst>
+                                          <p:attrName>style.visibility</p:attrName>
+                                        </p:attrNameLst>
+                                      </p:cBhvr>
+                                      <p:to>
+                                        <p:strVal val="visible"/>
+                                      </p:to>
+                                    </p:set>
+                                  </p:childTnLst>
+                                </p:cTn>
+                              </p:par>
+                            </p:childTnLst>
+                          </p:cTn>
+                        </p:par>
+                      </p:childTnLst>
+                    </p:cTn>
+                  </p:par>
+                  <p:par>
+                    <p:cTn id="15" fill="hold">
+                      <p:stCondLst>
+                        <p:cond delay="indefinite"/>
+                      </p:stCondLst>
+                      <p:childTnLst>
+                        <p:par>
+                          <p:cTn id="16" fill="hold">
+                            <p:stCondLst>
+                              <p:cond delay="0"/>
+                            </p:stCondLst>
+                            <p:childTnLst>
+                              <p:par>
+                                <p:cTn id="17" presetID="1" presetClass="entr" presetSubtype="0" fill="hold" nodeType="clickEffect">
+                                  <p:stCondLst>
+                                    <p:cond delay="0"/>
+                                  </p:stCondLst>
+                                  <p:childTnLst>
+                                    <p:set>
+                                      <p:cBhvr>
+                                        <p:cTn id="18" dur="1" fill="hold">
+                                          <p:stCondLst>
+                                            <p:cond delay="0"/>
+                                          </p:stCondLst>
+                                        </p:cTn>
+                                        <p:tgtEl>
+                                          <p:spTgt spid="3">
+                                            <p:txEl>
+                                              <p:pRg st="3" end="3"/>
+                                            </p:txEl>
+                                          </p:spTgt>
+                                        </p:tgtEl>
+                                        <p:attrNameLst>
+                                          <p:attrName>style.visibility</p:attrName>
+                                        </p:attrNameLst>
+                                      </p:cBhvr>
+                                      <p:to>
+                                        <p:strVal val="visible"/>
+                                      </p:to>
+                                    </p:set>
+                                  </p:childTnLst>
+                                </p:cTn>
+                              </p:par>
+                            </p:childTnLst>
+                          </p:cTn>
+                        </p:par>
+                      </p:childTnLst>
+                    </p:cTn>
+                  </p:par>
+                  <p:par>
+                    <p:cTn id="19" fill="hold">
+                      <p:stCondLst>
+                        <p:cond delay="indefinite"/>
+                      </p:stCondLst>
+                      <p:childTnLst>
+                        <p:par>
+                          <p:cTn id="20" fill="hold">
+                            <p:stCondLst>
+                              <p:cond delay="0"/>
+                            </p:stCondLst>
+                            <p:childTnLst>
+                              <p:par>
+                                <p:cTn id="21" presetID="1" presetClass="entr" presetSubtype="0" fill="hold" nodeType="clickEffect">
+                                  <p:stCondLst>
+                                    <p:cond delay="0"/>
+                                  </p:stCondLst>
+                                  <p:childTnLst>
+                                    <p:set>
+                                      <p:cBhvr>
+                                        <p:cTn id="22" dur="1" fill="hold">
+                                          <p:stCondLst>
+                                            <p:cond delay="0"/>
+                                          </p:stCondLst>
+                                        </p:cTn>
+                                        <p:tgtEl>
+                                          <p:spTgt spid="3">
+                                            <p:txEl>
+                                              <p:pRg st="4" end="4"/>
+                                            </p:txEl>
+                                          </p:spTgt>
+                                        </p:tgtEl>
+                                        <p:attrNameLst>
+                                          <p:attrName>style.visibility</p:attrName>
+                                        </p:attrNameLst>
+                                      </p:cBhvr>
+                                      <p:to>
+                                        <p:strVal val="visible"/>
+                                      </p:to>
+                                    </p:set>
+                                  </p:childTnLst>
+                                </p:cTn>
+                              </p:par>
+                            </p:childTnLst>
+                          </p:cTn>
+                        </p:par>
+                      </p:childTnLst>
+                    </p:cTn>
+                  </p:par>
+                  <p:par>
+                    <p:cTn id="23" fill="hold">
+                      <p:stCondLst>
+                        <p:cond delay="indefinite"/>
+                      </p:stCondLst>
+                      <p:childTnLst>
+                        <p:par>
+                          <p:cTn id="24" fill="hold">
+                            <p:stCondLst>
+                              <p:cond delay="0"/>
+                            </p:stCondLst>
+                            <p:childTnLst>
+                              <p:par>
+                                <p:cTn id="25" presetID="1" presetClass="entr" presetSubtype="0" fill="hold" nodeType="clickEffect">
+                                  <p:stCondLst>
+                                    <p:cond delay="0"/>
+                                  </p:stCondLst>
+                                  <p:childTnLst>
+                                    <p:set>
+                                      <p:cBhvr>
+                                        <p:cTn id="26" dur="1" fill="hold">
+                                          <p:stCondLst>
+                                            <p:cond delay="0"/>
+                                          </p:stCondLst>
+                                        </p:cTn>
+                                        <p:tgtEl>
+                                          <p:spTgt spid="3">
+                                            <p:txEl>
+                                              <p:pRg st="5" end="5"/>
+                                            </p:txEl>
+                                          </p:spTgt>
+                                        </p:tgtEl>
+                                        <p:attrNameLst>
+                                          <p:attrName>style.visibility</p:attrName>
+                                        </p:attrNameLst>
+                                      </p:cBhvr>
+                                      <p:to>
+                                        <p:strVal val="visible"/>
+                                      </p:to>
+                                    </p:set>
+                                  </p:childTnLst>
+                                </p:cTn>
+                              </p:par>
+                            </p:childTnLst>
+                          </p:cTn>
+                        </p:par>
+                      </p:childTnLst>
+                    </p:cTn>
+                  </p:par>
+                  <p:par>
+                    <p:cTn id="27" fill="hold">
+                      <p:stCondLst>
+                        <p:cond delay="indefinite"/>
+                      </p:stCondLst>
+                      <p:childTnLst>
+                        <p:par>
+                          <p:cTn id="28" fill="hold">
+                            <p:stCondLst>
+                              <p:cond delay="0"/>
+                            </p:stCondLst>
+                            <p:childTnLst>
+                              <p:par>
+                                <p:cTn id="29" presetID="1" presetClass="entr" presetSubtype="0" fill="hold" nodeType="clickEffect">
+                                  <p:stCondLst>
+                                    <p:cond delay="0"/>
+                                  </p:stCondLst>
+                                  <p:childTnLst>
+                                    <p:set>
+                                      <p:cBhvr>
+                                        <p:cTn id="30" dur="1" fill="hold">
+                                          <p:stCondLst>
+                                            <p:cond delay="0"/>
+                                          </p:stCondLst>
+                                        </p:cTn>
+                                        <p:tgtEl>
+                                          <p:spTgt spid="3">
+                                            <p:txEl>
+                                              <p:pRg st="6" end="6"/>
+                                            </p:txEl>
+                                          </p:spTgt>
+                                        </p:tgtEl>
+                                        <p:attrNameLst>
+                                          <p:attrName>style.visibility</p:attrName>
+                                        </p:attrNameLst>
+                                      </p:cBhvr>
+                                      <p:to>
+                                        <p:strVal val="visible"/>
+                                      </p:to>
+                                    </p:set>
+                                  </p:childTnLst>
+                                </p:cTn>
+                              </p:par>
+                            </p:childTnLst>
+                          </p:cTn>
+                        </p:par>
+                      </p:childTnLst>
+                    </p:cTn>
+                  </p:par>
+                </p:childTnLst>
+              </p:cTn>
+              <p:prevCondLst>
+                <p:cond evt="onPrev" delay="0">
+                  <p:tgtEl>
+                    <p:sldTgt/>
+                  </p:tgtEl>
+                </p:cond>
+              </p:prevCondLst>
+              <p:nextCondLst>
+                <p:cond evt="onNext" delay="0">
+                  <p:tgtEl>
+                    <p:sldTgt/>
+                  </p:tgtEl>
+                </p:cond>
+              </p:nextCondLst>
+            </p:seq>
+          </p:childTnLst>
+        </p:cTn>
       </p:par>
     </p:tnLst>
   </p:timing>

</xml_diff>